<commit_message>
demo2 created, demo1 and demo2 files separated and named
</commit_message>
<xml_diff>
--- a/Assessment/Jordan Wesson TDD.pptx
+++ b/Assessment/Jordan Wesson TDD.pptx
@@ -25,7 +25,6 @@
     <p:sldId id="274" r:id="rId19"/>
     <p:sldId id="275" r:id="rId20"/>
     <p:sldId id="276" r:id="rId21"/>
-    <p:sldId id="277" r:id="rId22"/>
   </p:sldIdLst>
   <p:sldSz cx="12192000" cy="6858000"/>
   <p:notesSz cx="6858000" cy="9144000"/>
@@ -284,7 +283,7 @@
           <a:p>
             <a:fld id="{81B8F32D-D8B6-4B9E-9CBF-DCAC30B7B93D}" type="datetimeFigureOut">
               <a:rPr lang="en-US" smtClean="0"/>
-              <a:t>7/14/2021</a:t>
+              <a:t>7/27/2021</a:t>
             </a:fld>
             <a:endParaRPr lang="en-US"/>
           </a:p>
@@ -600,7 +599,7 @@
           <a:p>
             <a:fld id="{81B8F32D-D8B6-4B9E-9CBF-DCAC30B7B93D}" type="datetimeFigureOut">
               <a:rPr lang="en-US" smtClean="0"/>
-              <a:t>7/14/2021</a:t>
+              <a:t>7/27/2021</a:t>
             </a:fld>
             <a:endParaRPr lang="en-US"/>
           </a:p>
@@ -905,7 +904,7 @@
           <a:p>
             <a:fld id="{81B8F32D-D8B6-4B9E-9CBF-DCAC30B7B93D}" type="datetimeFigureOut">
               <a:rPr lang="en-US" smtClean="0"/>
-              <a:t>7/14/2021</a:t>
+              <a:t>7/27/2021</a:t>
             </a:fld>
             <a:endParaRPr lang="en-US"/>
           </a:p>
@@ -1112,7 +1111,7 @@
           <a:p>
             <a:fld id="{81B8F32D-D8B6-4B9E-9CBF-DCAC30B7B93D}" type="datetimeFigureOut">
               <a:rPr lang="en-US" smtClean="0"/>
-              <a:t>7/14/2021</a:t>
+              <a:t>7/27/2021</a:t>
             </a:fld>
             <a:endParaRPr lang="en-US"/>
           </a:p>
@@ -1460,7 +1459,7 @@
           <a:p>
             <a:fld id="{81B8F32D-D8B6-4B9E-9CBF-DCAC30B7B93D}" type="datetimeFigureOut">
               <a:rPr lang="en-US" smtClean="0"/>
-              <a:t>7/14/2021</a:t>
+              <a:t>7/27/2021</a:t>
             </a:fld>
             <a:endParaRPr lang="en-US"/>
           </a:p>
@@ -1931,7 +1930,7 @@
           <a:p>
             <a:fld id="{81B8F32D-D8B6-4B9E-9CBF-DCAC30B7B93D}" type="datetimeFigureOut">
               <a:rPr lang="en-US" smtClean="0"/>
-              <a:t>7/14/2021</a:t>
+              <a:t>7/27/2021</a:t>
             </a:fld>
             <a:endParaRPr lang="en-US"/>
           </a:p>
@@ -2466,7 +2465,7 @@
           <a:p>
             <a:fld id="{81B8F32D-D8B6-4B9E-9CBF-DCAC30B7B93D}" type="datetimeFigureOut">
               <a:rPr lang="en-US" smtClean="0"/>
-              <a:t>7/14/2021</a:t>
+              <a:t>7/27/2021</a:t>
             </a:fld>
             <a:endParaRPr lang="en-US"/>
           </a:p>
@@ -2683,7 +2682,7 @@
           <a:p>
             <a:fld id="{81B8F32D-D8B6-4B9E-9CBF-DCAC30B7B93D}" type="datetimeFigureOut">
               <a:rPr lang="en-US" smtClean="0"/>
-              <a:t>7/14/2021</a:t>
+              <a:t>7/27/2021</a:t>
             </a:fld>
             <a:endParaRPr lang="en-US"/>
           </a:p>
@@ -2888,7 +2887,7 @@
           <a:p>
             <a:fld id="{81B8F32D-D8B6-4B9E-9CBF-DCAC30B7B93D}" type="datetimeFigureOut">
               <a:rPr lang="en-US" smtClean="0"/>
-              <a:t>7/14/2021</a:t>
+              <a:t>7/27/2021</a:t>
             </a:fld>
             <a:endParaRPr lang="en-US"/>
           </a:p>
@@ -3218,7 +3217,7 @@
           <a:p>
             <a:fld id="{81B8F32D-D8B6-4B9E-9CBF-DCAC30B7B93D}" type="datetimeFigureOut">
               <a:rPr lang="en-US" smtClean="0"/>
-              <a:t>7/14/2021</a:t>
+              <a:t>7/27/2021</a:t>
             </a:fld>
             <a:endParaRPr lang="en-US"/>
           </a:p>
@@ -3528,7 +3527,7 @@
           <a:p>
             <a:fld id="{81B8F32D-D8B6-4B9E-9CBF-DCAC30B7B93D}" type="datetimeFigureOut">
               <a:rPr lang="en-US" smtClean="0"/>
-              <a:t>7/14/2021</a:t>
+              <a:t>7/27/2021</a:t>
             </a:fld>
             <a:endParaRPr lang="en-US"/>
           </a:p>
@@ -3769,7 +3768,7 @@
             <a:fld id="{81B8F32D-D8B6-4B9E-9CBF-DCAC30B7B93D}" type="datetimeFigureOut">
               <a:rPr lang="en-US" smtClean="0"/>
               <a:pPr/>
-              <a:t>7/14/2021</a:t>
+              <a:t>7/27/2021</a:t>
             </a:fld>
             <a:endParaRPr lang="en-US" dirty="0"/>
           </a:p>
@@ -7314,99 +7313,6 @@
 </p:sld>
 </file>
 
-<file path=ppt/slides/slide21.xml><?xml version="1.0" encoding="utf-8"?>
-<p:sld xmlns:a="http://schemas.openxmlformats.org/drawingml/2006/main" xmlns:r="http://schemas.openxmlformats.org/officeDocument/2006/relationships" xmlns:p="http://schemas.openxmlformats.org/presentationml/2006/main">
-  <p:cSld>
-    <p:spTree>
-      <p:nvGrpSpPr>
-        <p:cNvPr id="1" name=""/>
-        <p:cNvGrpSpPr/>
-        <p:nvPr/>
-      </p:nvGrpSpPr>
-      <p:grpSpPr>
-        <a:xfrm>
-          <a:off x="0" y="0"/>
-          <a:ext cx="0" cy="0"/>
-          <a:chOff x="0" y="0"/>
-          <a:chExt cx="0" cy="0"/>
-        </a:xfrm>
-      </p:grpSpPr>
-      <p:sp>
-        <p:nvSpPr>
-          <p:cNvPr id="2" name="Title 1">
-            <a:extLst>
-              <a:ext uri="{FF2B5EF4-FFF2-40B4-BE49-F238E27FC236}">
-                <a16:creationId xmlns:a16="http://schemas.microsoft.com/office/drawing/2014/main" id="{84F877D3-839B-4465-B541-095409D6AD96}"/>
-              </a:ext>
-            </a:extLst>
-          </p:cNvPr>
-          <p:cNvSpPr>
-            <a:spLocks noGrp="1"/>
-          </p:cNvSpPr>
-          <p:nvPr>
-            <p:ph type="ctrTitle"/>
-          </p:nvPr>
-        </p:nvSpPr>
-        <p:spPr>
-          <a:xfrm>
-            <a:off x="482599" y="-540292"/>
-            <a:ext cx="10506991" cy="2531555"/>
-          </a:xfrm>
-        </p:spPr>
-        <p:txBody>
-          <a:bodyPr/>
-          <a:lstStyle/>
-          <a:p>
-            <a:endParaRPr lang="en-AU" dirty="0"/>
-          </a:p>
-        </p:txBody>
-      </p:sp>
-      <p:sp>
-        <p:nvSpPr>
-          <p:cNvPr id="3" name="Subtitle 2">
-            <a:extLst>
-              <a:ext uri="{FF2B5EF4-FFF2-40B4-BE49-F238E27FC236}">
-                <a16:creationId xmlns:a16="http://schemas.microsoft.com/office/drawing/2014/main" id="{2BC5A390-3123-4129-9AD0-B6F121063F06}"/>
-              </a:ext>
-            </a:extLst>
-          </p:cNvPr>
-          <p:cNvSpPr>
-            <a:spLocks noGrp="1"/>
-          </p:cNvSpPr>
-          <p:nvPr>
-            <p:ph type="subTitle" idx="1"/>
-          </p:nvPr>
-        </p:nvSpPr>
-        <p:spPr>
-          <a:xfrm>
-            <a:off x="482600" y="2234316"/>
-            <a:ext cx="10506991" cy="3645275"/>
-          </a:xfrm>
-        </p:spPr>
-        <p:txBody>
-          <a:bodyPr/>
-          <a:lstStyle/>
-          <a:p>
-            <a:r>
-              <a:rPr lang="en-AU" dirty="0"/>
-              <a:t>REDO EVERYTHING</a:t>
-            </a:r>
-          </a:p>
-        </p:txBody>
-      </p:sp>
-    </p:spTree>
-    <p:extLst>
-      <p:ext uri="{BB962C8B-B14F-4D97-AF65-F5344CB8AC3E}">
-        <p14:creationId xmlns:p14="http://schemas.microsoft.com/office/powerpoint/2010/main" val="1933082331"/>
-      </p:ext>
-    </p:extLst>
-  </p:cSld>
-  <p:clrMapOvr>
-    <a:masterClrMapping/>
-  </p:clrMapOvr>
-</p:sld>
-</file>
-
 <file path=ppt/slides/slide3.xml><?xml version="1.0" encoding="utf-8"?>
 <p:sld xmlns:a="http://schemas.openxmlformats.org/drawingml/2006/main" xmlns:r="http://schemas.openxmlformats.org/officeDocument/2006/relationships" xmlns:p="http://schemas.openxmlformats.org/presentationml/2006/main">
   <p:cSld>
@@ -7970,7 +7876,7 @@
           <a:p>
             <a:r>
               <a:rPr lang="en-AU" dirty="0"/>
-              <a:t>States:</a:t>
+              <a:t>States: (stretch goal)</a:t>
             </a:r>
           </a:p>
           <a:p>

</xml_diff>